<commit_message>
all-slides.pdf code.zip modules.pdf modules.pptx text.pdf text.pptx
</commit_message>
<xml_diff>
--- a/ipsa/slides/modules.pptx
+++ b/ipsa/slides/modules.pptx
@@ -140,10 +140,25 @@
   <pc:docChgLst>
     <pc:chgData name="Gerth Stølting Brodal" userId="04ef4784-6591-4f86-a140-f5c3b108582a" providerId="ADAL" clId="{808A8E8C-E864-4F20-9592-16FE57C30321}"/>
     <pc:docChg chg="undo custSel modSld">
-      <pc:chgData name="Gerth Stølting Brodal" userId="04ef4784-6591-4f86-a140-f5c3b108582a" providerId="ADAL" clId="{808A8E8C-E864-4F20-9592-16FE57C30321}" dt="2024-04-17T07:05:57.485" v="99" actId="20577"/>
+      <pc:chgData name="Gerth Stølting Brodal" userId="04ef4784-6591-4f86-a140-f5c3b108582a" providerId="ADAL" clId="{808A8E8C-E864-4F20-9592-16FE57C30321}" dt="2024-04-21T21:04:14.800" v="105" actId="20577"/>
       <pc:docMkLst>
         <pc:docMk/>
       </pc:docMkLst>
+      <pc:sldChg chg="modSp mod">
+        <pc:chgData name="Gerth Stølting Brodal" userId="04ef4784-6591-4f86-a140-f5c3b108582a" providerId="ADAL" clId="{808A8E8C-E864-4F20-9592-16FE57C30321}" dt="2024-04-21T21:04:14.800" v="105" actId="20577"/>
+        <pc:sldMkLst>
+          <pc:docMk/>
+          <pc:sldMk cId="1591653014" sldId="466"/>
+        </pc:sldMkLst>
+        <pc:spChg chg="mod">
+          <ac:chgData name="Gerth Stølting Brodal" userId="04ef4784-6591-4f86-a140-f5c3b108582a" providerId="ADAL" clId="{808A8E8C-E864-4F20-9592-16FE57C30321}" dt="2024-04-21T21:04:14.800" v="105" actId="20577"/>
+          <ac:spMkLst>
+            <pc:docMk/>
+            <pc:sldMk cId="1591653014" sldId="466"/>
+            <ac:spMk id="3" creationId="{00000000-0000-0000-0000-000000000000}"/>
+          </ac:spMkLst>
+        </pc:spChg>
+      </pc:sldChg>
       <pc:sldChg chg="modNotesTx">
         <pc:chgData name="Gerth Stølting Brodal" userId="04ef4784-6591-4f86-a140-f5c3b108582a" providerId="ADAL" clId="{808A8E8C-E864-4F20-9592-16FE57C30321}" dt="2024-04-17T07:05:57.485" v="99" actId="20577"/>
         <pc:sldMkLst>
@@ -611,7 +626,7 @@
           <a:p>
             <a:fld id="{FB1A172F-81D4-4DC4-9113-1DBD56EC3646}" type="datetimeFigureOut">
               <a:rPr lang="en-US" smtClean="0"/>
-              <a:t>4/17/2024</a:t>
+              <a:t>4/21/2024</a:t>
             </a:fld>
             <a:endParaRPr lang="en-US"/>
           </a:p>
@@ -2208,7 +2223,7 @@
           <a:p>
             <a:fld id="{0560A9CD-0304-4E0B-9E82-E7E0115DE05B}" type="datetimeFigureOut">
               <a:rPr lang="en-US" smtClean="0"/>
-              <a:t>4/17/2024</a:t>
+              <a:t>4/21/2024</a:t>
             </a:fld>
             <a:endParaRPr lang="en-US"/>
           </a:p>
@@ -2376,7 +2391,7 @@
           <a:p>
             <a:fld id="{0560A9CD-0304-4E0B-9E82-E7E0115DE05B}" type="datetimeFigureOut">
               <a:rPr lang="en-US" smtClean="0"/>
-              <a:t>4/17/2024</a:t>
+              <a:t>4/21/2024</a:t>
             </a:fld>
             <a:endParaRPr lang="en-US"/>
           </a:p>
@@ -2554,7 +2569,7 @@
           <a:p>
             <a:fld id="{0560A9CD-0304-4E0B-9E82-E7E0115DE05B}" type="datetimeFigureOut">
               <a:rPr lang="en-US" smtClean="0"/>
-              <a:t>4/17/2024</a:t>
+              <a:t>4/21/2024</a:t>
             </a:fld>
             <a:endParaRPr lang="en-US"/>
           </a:p>
@@ -2737,7 +2752,7 @@
           <a:p>
             <a:fld id="{0560A9CD-0304-4E0B-9E82-E7E0115DE05B}" type="datetimeFigureOut">
               <a:rPr lang="en-US" smtClean="0"/>
-              <a:t>4/17/2024</a:t>
+              <a:t>4/21/2024</a:t>
             </a:fld>
             <a:endParaRPr lang="en-US"/>
           </a:p>
@@ -2982,7 +2997,7 @@
           <a:p>
             <a:fld id="{0560A9CD-0304-4E0B-9E82-E7E0115DE05B}" type="datetimeFigureOut">
               <a:rPr lang="en-US" smtClean="0"/>
-              <a:t>4/17/2024</a:t>
+              <a:t>4/21/2024</a:t>
             </a:fld>
             <a:endParaRPr lang="en-US"/>
           </a:p>
@@ -3211,7 +3226,7 @@
           <a:p>
             <a:fld id="{0560A9CD-0304-4E0B-9E82-E7E0115DE05B}" type="datetimeFigureOut">
               <a:rPr lang="en-US" smtClean="0"/>
-              <a:t>4/17/2024</a:t>
+              <a:t>4/21/2024</a:t>
             </a:fld>
             <a:endParaRPr lang="en-US"/>
           </a:p>
@@ -3575,7 +3590,7 @@
           <a:p>
             <a:fld id="{0560A9CD-0304-4E0B-9E82-E7E0115DE05B}" type="datetimeFigureOut">
               <a:rPr lang="en-US" smtClean="0"/>
-              <a:t>4/17/2024</a:t>
+              <a:t>4/21/2024</a:t>
             </a:fld>
             <a:endParaRPr lang="en-US"/>
           </a:p>
@@ -3692,7 +3707,7 @@
           <a:p>
             <a:fld id="{0560A9CD-0304-4E0B-9E82-E7E0115DE05B}" type="datetimeFigureOut">
               <a:rPr lang="en-US" smtClean="0"/>
-              <a:t>4/17/2024</a:t>
+              <a:t>4/21/2024</a:t>
             </a:fld>
             <a:endParaRPr lang="en-US"/>
           </a:p>
@@ -3787,7 +3802,7 @@
           <a:p>
             <a:fld id="{0560A9CD-0304-4E0B-9E82-E7E0115DE05B}" type="datetimeFigureOut">
               <a:rPr lang="en-US" smtClean="0"/>
-              <a:t>4/17/2024</a:t>
+              <a:t>4/21/2024</a:t>
             </a:fld>
             <a:endParaRPr lang="en-US"/>
           </a:p>
@@ -4062,7 +4077,7 @@
           <a:p>
             <a:fld id="{0560A9CD-0304-4E0B-9E82-E7E0115DE05B}" type="datetimeFigureOut">
               <a:rPr lang="en-US" smtClean="0"/>
-              <a:t>4/17/2024</a:t>
+              <a:t>4/21/2024</a:t>
             </a:fld>
             <a:endParaRPr lang="en-US"/>
           </a:p>
@@ -4314,7 +4329,7 @@
           <a:p>
             <a:fld id="{0560A9CD-0304-4E0B-9E82-E7E0115DE05B}" type="datetimeFigureOut">
               <a:rPr lang="en-US" smtClean="0"/>
-              <a:t>4/17/2024</a:t>
+              <a:t>4/21/2024</a:t>
             </a:fld>
             <a:endParaRPr lang="en-US"/>
           </a:p>
@@ -4525,7 +4540,7 @@
           <a:p>
             <a:fld id="{0560A9CD-0304-4E0B-9E82-E7E0115DE05B}" type="datetimeFigureOut">
               <a:rPr lang="en-US" smtClean="0"/>
-              <a:t>4/17/2024</a:t>
+              <a:t>4/21/2024</a:t>
             </a:fld>
             <a:endParaRPr lang="en-US"/>
           </a:p>
@@ -5014,6 +5029,12 @@
             <a:r>
               <a:rPr lang="da-DK" dirty="0"/>
               <a:t>__'</a:t>
+            </a:r>
+          </a:p>
+          <a:p>
+            <a:r>
+              <a:rPr lang="da-DK"/>
+              <a:t>heapq</a:t>
             </a:r>
             <a:endParaRPr lang="en-US" dirty="0"/>
           </a:p>

</xml_diff>